<commit_message>
Sprint Two Elaboration Presentation
Finalized Presentation
</commit_message>
<xml_diff>
--- a/Presentations/Sprint Two Elaboration.pptx
+++ b/Presentations/Sprint Two Elaboration.pptx
@@ -9,11 +9,12 @@
     <p:sldId id="257" r:id="rId3"/>
     <p:sldId id="258" r:id="rId4"/>
     <p:sldId id="259" r:id="rId5"/>
-    <p:sldId id="260" r:id="rId6"/>
-    <p:sldId id="261" r:id="rId7"/>
-    <p:sldId id="262" r:id="rId8"/>
-    <p:sldId id="263" r:id="rId9"/>
-    <p:sldId id="264" r:id="rId10"/>
+    <p:sldId id="266" r:id="rId6"/>
+    <p:sldId id="260" r:id="rId7"/>
+    <p:sldId id="261" r:id="rId8"/>
+    <p:sldId id="262" r:id="rId9"/>
+    <p:sldId id="263" r:id="rId10"/>
+    <p:sldId id="264" r:id="rId11"/>
   </p:sldIdLst>
   <p:sldSz cx="12192000" cy="6858000"/>
   <p:notesSz cx="6858000" cy="9144000"/>
@@ -5473,6 +5474,78 @@
 </p:sld>
 </file>
 
+<file path=ppt/slides/slide10.xml><?xml version="1.0" encoding="utf-8"?>
+<p:sld xmlns:a="http://schemas.openxmlformats.org/drawingml/2006/main" xmlns:r="http://schemas.openxmlformats.org/officeDocument/2006/relationships" xmlns:p="http://schemas.openxmlformats.org/presentationml/2006/main">
+  <p:cSld>
+    <p:spTree>
+      <p:nvGrpSpPr>
+        <p:cNvPr id="1" name=""/>
+        <p:cNvGrpSpPr/>
+        <p:nvPr/>
+      </p:nvGrpSpPr>
+      <p:grpSpPr>
+        <a:xfrm>
+          <a:off x="0" y="0"/>
+          <a:ext cx="0" cy="0"/>
+          <a:chOff x="0" y="0"/>
+          <a:chExt cx="0" cy="0"/>
+        </a:xfrm>
+      </p:grpSpPr>
+      <p:sp>
+        <p:nvSpPr>
+          <p:cNvPr id="2" name="Title 1"/>
+          <p:cNvSpPr>
+            <a:spLocks noGrp="1"/>
+          </p:cNvSpPr>
+          <p:nvPr>
+            <p:ph type="title"/>
+          </p:nvPr>
+        </p:nvSpPr>
+        <p:spPr/>
+        <p:txBody>
+          <a:bodyPr/>
+          <a:lstStyle/>
+          <a:p>
+            <a:r>
+              <a:rPr lang="en-US" dirty="0" smtClean="0"/>
+              <a:t>Questions?</a:t>
+            </a:r>
+            <a:endParaRPr lang="en-US" dirty="0"/>
+          </a:p>
+        </p:txBody>
+      </p:sp>
+      <p:sp>
+        <p:nvSpPr>
+          <p:cNvPr id="3" name="Content Placeholder 2"/>
+          <p:cNvSpPr>
+            <a:spLocks noGrp="1"/>
+          </p:cNvSpPr>
+          <p:nvPr>
+            <p:ph idx="1"/>
+          </p:nvPr>
+        </p:nvSpPr>
+        <p:spPr/>
+        <p:txBody>
+          <a:bodyPr/>
+          <a:lstStyle/>
+          <a:p>
+            <a:endParaRPr lang="en-US"/>
+          </a:p>
+        </p:txBody>
+      </p:sp>
+    </p:spTree>
+    <p:extLst>
+      <p:ext uri="{BB962C8B-B14F-4D97-AF65-F5344CB8AC3E}">
+        <p14:creationId xmlns:p14="http://schemas.microsoft.com/office/powerpoint/2010/main" val="3068148798"/>
+      </p:ext>
+    </p:extLst>
+  </p:cSld>
+  <p:clrMapOvr>
+    <a:masterClrMapping/>
+  </p:clrMapOvr>
+</p:sld>
+</file>
+
 <file path=ppt/slides/slide2.xml><?xml version="1.0" encoding="utf-8"?>
 <p:sld xmlns:a="http://schemas.openxmlformats.org/drawingml/2006/main" xmlns:r="http://schemas.openxmlformats.org/officeDocument/2006/relationships" xmlns:p="http://schemas.openxmlformats.org/presentationml/2006/main">
   <p:cSld>
@@ -5559,9 +5632,9 @@
       </p:grpSpPr>
       <p:pic>
         <p:nvPicPr>
-          <p:cNvPr id="2050" name="Picture 2" descr="https://raw.githubusercontent.com/DucksDucksDucks/Game_Of_Phones_Design/master/Wiki/images/Ask%20a%20Question%20SqDiagram.png"/>
+          <p:cNvPr id="2" name="Picture 1"/>
           <p:cNvPicPr>
-            <a:picLocks noChangeAspect="1" noChangeArrowheads="1"/>
+            <a:picLocks noChangeAspect="1"/>
           </p:cNvPicPr>
           <p:nvPr/>
         </p:nvPicPr>
@@ -5573,29 +5646,18 @@
               </a:ext>
             </a:extLst>
           </a:blip>
-          <a:srcRect/>
           <a:stretch>
             <a:fillRect/>
           </a:stretch>
         </p:blipFill>
-        <p:spPr bwMode="auto">
+        <p:spPr>
           <a:xfrm>
-            <a:off x="1517845" y="185541"/>
-            <a:ext cx="9629775" cy="6305551"/>
+            <a:off x="1352306" y="1854119"/>
+            <a:ext cx="9487388" cy="3149762"/>
           </a:xfrm>
           <a:prstGeom prst="rect">
             <a:avLst/>
           </a:prstGeom>
-          <a:noFill/>
-          <a:extLst>
-            <a:ext uri="{909E8E84-426E-40DD-AFC4-6F175D3DCCD1}">
-              <a14:hiddenFill xmlns:a14="http://schemas.microsoft.com/office/drawing/2010/main">
-                <a:solidFill>
-                  <a:srgbClr val="FFFFFF"/>
-                </a:solidFill>
-              </a14:hiddenFill>
-            </a:ext>
-          </a:extLst>
         </p:spPr>
       </p:pic>
     </p:spTree>
@@ -5630,9 +5692,9 @@
       </p:grpSpPr>
       <p:pic>
         <p:nvPicPr>
-          <p:cNvPr id="3074" name="Picture 2" descr="https://raw.githubusercontent.com/DucksDucksDucks/Game_Of_Phones_Design/master/Wiki/images/Answer%20a%20Question%20SqDiagram.png"/>
+          <p:cNvPr id="2" name="Picture 1"/>
           <p:cNvPicPr>
-            <a:picLocks noChangeAspect="1" noChangeArrowheads="1"/>
+            <a:picLocks noChangeAspect="1"/>
           </p:cNvPicPr>
           <p:nvPr/>
         </p:nvPicPr>
@@ -5644,29 +5706,18 @@
               </a:ext>
             </a:extLst>
           </a:blip>
-          <a:srcRect/>
           <a:stretch>
             <a:fillRect/>
           </a:stretch>
         </p:blipFill>
-        <p:spPr bwMode="auto">
+        <p:spPr>
           <a:xfrm>
-            <a:off x="2481944" y="293188"/>
-            <a:ext cx="6986361" cy="6131134"/>
+            <a:off x="1609494" y="1574704"/>
+            <a:ext cx="8973011" cy="3708591"/>
           </a:xfrm>
           <a:prstGeom prst="rect">
             <a:avLst/>
           </a:prstGeom>
-          <a:noFill/>
-          <a:extLst>
-            <a:ext uri="{909E8E84-426E-40DD-AFC4-6F175D3DCCD1}">
-              <a14:hiddenFill xmlns:a14="http://schemas.microsoft.com/office/drawing/2010/main">
-                <a:solidFill>
-                  <a:srgbClr val="FFFFFF"/>
-                </a:solidFill>
-              </a14:hiddenFill>
-            </a:ext>
-          </a:extLst>
         </p:spPr>
       </p:pic>
     </p:spTree>
@@ -5683,6 +5734,66 @@
 </file>
 
 <file path=ppt/slides/slide5.xml><?xml version="1.0" encoding="utf-8"?>
+<p:sld xmlns:a="http://schemas.openxmlformats.org/drawingml/2006/main" xmlns:r="http://schemas.openxmlformats.org/officeDocument/2006/relationships" xmlns:p="http://schemas.openxmlformats.org/presentationml/2006/main">
+  <p:cSld>
+    <p:spTree>
+      <p:nvGrpSpPr>
+        <p:cNvPr id="1" name=""/>
+        <p:cNvGrpSpPr/>
+        <p:nvPr/>
+      </p:nvGrpSpPr>
+      <p:grpSpPr>
+        <a:xfrm>
+          <a:off x="0" y="0"/>
+          <a:ext cx="0" cy="0"/>
+          <a:chOff x="0" y="0"/>
+          <a:chExt cx="0" cy="0"/>
+        </a:xfrm>
+      </p:grpSpPr>
+      <p:pic>
+        <p:nvPicPr>
+          <p:cNvPr id="3" name="Picture 2"/>
+          <p:cNvPicPr>
+            <a:picLocks noChangeAspect="1"/>
+          </p:cNvPicPr>
+          <p:nvPr/>
+        </p:nvPicPr>
+        <p:blipFill>
+          <a:blip r:embed="rId2">
+            <a:extLst>
+              <a:ext uri="{28A0092B-C50C-407E-A947-70E740481C1C}">
+                <a14:useLocalDpi xmlns:a14="http://schemas.microsoft.com/office/drawing/2010/main" val="0"/>
+              </a:ext>
+            </a:extLst>
+          </a:blip>
+          <a:stretch>
+            <a:fillRect/>
+          </a:stretch>
+        </p:blipFill>
+        <p:spPr>
+          <a:xfrm>
+            <a:off x="1800004" y="355442"/>
+            <a:ext cx="8591992" cy="6147116"/>
+          </a:xfrm>
+          <a:prstGeom prst="rect">
+            <a:avLst/>
+          </a:prstGeom>
+        </p:spPr>
+      </p:pic>
+    </p:spTree>
+    <p:extLst>
+      <p:ext uri="{BB962C8B-B14F-4D97-AF65-F5344CB8AC3E}">
+        <p14:creationId xmlns:p14="http://schemas.microsoft.com/office/powerpoint/2010/main" val="2143903812"/>
+      </p:ext>
+    </p:extLst>
+  </p:cSld>
+  <p:clrMapOvr>
+    <a:masterClrMapping/>
+  </p:clrMapOvr>
+</p:sld>
+</file>
+
+<file path=ppt/slides/slide6.xml><?xml version="1.0" encoding="utf-8"?>
 <p:sld xmlns:a="http://schemas.openxmlformats.org/drawingml/2006/main" xmlns:r="http://schemas.openxmlformats.org/officeDocument/2006/relationships" xmlns:p="http://schemas.openxmlformats.org/presentationml/2006/main">
   <p:cSld>
     <p:spTree>
@@ -5742,7 +5853,7 @@
 </p:sld>
 </file>
 
-<file path=ppt/slides/slide6.xml><?xml version="1.0" encoding="utf-8"?>
+<file path=ppt/slides/slide7.xml><?xml version="1.0" encoding="utf-8"?>
 <p:sld xmlns:a="http://schemas.openxmlformats.org/drawingml/2006/main" xmlns:r="http://schemas.openxmlformats.org/officeDocument/2006/relationships" xmlns:p="http://schemas.openxmlformats.org/presentationml/2006/main">
   <p:cSld>
     <p:spTree>
@@ -5802,143 +5913,6 @@
 </p:sld>
 </file>
 
-<file path=ppt/slides/slide7.xml><?xml version="1.0" encoding="utf-8"?>
-<p:sld xmlns:a="http://schemas.openxmlformats.org/drawingml/2006/main" xmlns:r="http://schemas.openxmlformats.org/officeDocument/2006/relationships" xmlns:p="http://schemas.openxmlformats.org/presentationml/2006/main">
-  <p:cSld>
-    <p:spTree>
-      <p:nvGrpSpPr>
-        <p:cNvPr id="1" name=""/>
-        <p:cNvGrpSpPr/>
-        <p:nvPr/>
-      </p:nvGrpSpPr>
-      <p:grpSpPr>
-        <a:xfrm>
-          <a:off x="0" y="0"/>
-          <a:ext cx="0" cy="0"/>
-          <a:chOff x="0" y="0"/>
-          <a:chExt cx="0" cy="0"/>
-        </a:xfrm>
-      </p:grpSpPr>
-      <p:sp>
-        <p:nvSpPr>
-          <p:cNvPr id="3" name="Title 2"/>
-          <p:cNvSpPr>
-            <a:spLocks noGrp="1"/>
-          </p:cNvSpPr>
-          <p:nvPr>
-            <p:ph type="title"/>
-          </p:nvPr>
-        </p:nvSpPr>
-        <p:spPr/>
-        <p:txBody>
-          <a:bodyPr/>
-          <a:lstStyle/>
-          <a:p>
-            <a:r>
-              <a:rPr lang="en-US" dirty="0" smtClean="0"/>
-              <a:t>Acceptance plan</a:t>
-            </a:r>
-            <a:endParaRPr lang="en-US" dirty="0"/>
-          </a:p>
-        </p:txBody>
-      </p:sp>
-      <p:sp>
-        <p:nvSpPr>
-          <p:cNvPr id="4" name="Content Placeholder 3"/>
-          <p:cNvSpPr>
-            <a:spLocks noGrp="1"/>
-          </p:cNvSpPr>
-          <p:nvPr>
-            <p:ph idx="1"/>
-          </p:nvPr>
-        </p:nvSpPr>
-        <p:spPr/>
-        <p:txBody>
-          <a:bodyPr>
-            <a:normAutofit fontScale="85000" lnSpcReduction="10000"/>
-          </a:bodyPr>
-          <a:lstStyle/>
-          <a:p>
-            <a:r>
-              <a:rPr lang="en-US" dirty="0"/>
-              <a:t>Display Current Question </a:t>
-            </a:r>
-          </a:p>
-          <a:p>
-            <a:pPr lvl="1"/>
-            <a:r>
-              <a:rPr lang="en-US" dirty="0"/>
-              <a:t>Selected question is displayed on desktop application</a:t>
-            </a:r>
-          </a:p>
-          <a:p>
-            <a:r>
-              <a:rPr lang="en-US" dirty="0"/>
-              <a:t>Selected Displayed Answers </a:t>
-            </a:r>
-          </a:p>
-          <a:p>
-            <a:pPr lvl="1"/>
-            <a:r>
-              <a:rPr lang="en-US" dirty="0"/>
-              <a:t>Desktop app can display selected answers</a:t>
-            </a:r>
-          </a:p>
-          <a:p>
-            <a:r>
-              <a:rPr lang="en-US" dirty="0"/>
-              <a:t>See if Answer is Chosen </a:t>
-            </a:r>
-          </a:p>
-          <a:p>
-            <a:pPr lvl="1"/>
-            <a:r>
-              <a:rPr lang="en-US" dirty="0"/>
-              <a:t>App notifies user when their answer is chosen</a:t>
-            </a:r>
-          </a:p>
-          <a:p>
-            <a:r>
-              <a:rPr lang="en-US" dirty="0"/>
-              <a:t>Tests </a:t>
-            </a:r>
-          </a:p>
-          <a:p>
-            <a:pPr lvl="1"/>
-            <a:r>
-              <a:rPr lang="en-US" dirty="0"/>
-              <a:t>Choose a question and make sure it is being displayed on the desktop</a:t>
-            </a:r>
-          </a:p>
-          <a:p>
-            <a:pPr lvl="1"/>
-            <a:r>
-              <a:rPr lang="en-US" dirty="0"/>
-              <a:t>Select answers to be displayed and make sure they are being displayed</a:t>
-            </a:r>
-          </a:p>
-          <a:p>
-            <a:pPr lvl="1"/>
-            <a:r>
-              <a:rPr lang="en-US" dirty="0"/>
-              <a:t>Select an answer to be displayed and make sure the app notifies the user</a:t>
-            </a:r>
-          </a:p>
-        </p:txBody>
-      </p:sp>
-    </p:spTree>
-    <p:extLst>
-      <p:ext uri="{BB962C8B-B14F-4D97-AF65-F5344CB8AC3E}">
-        <p14:creationId xmlns:p14="http://schemas.microsoft.com/office/powerpoint/2010/main" val="1888057330"/>
-      </p:ext>
-    </p:extLst>
-  </p:cSld>
-  <p:clrMapOvr>
-    <a:masterClrMapping/>
-  </p:clrMapOvr>
-</p:sld>
-</file>
-
 <file path=ppt/slides/slide8.xml><?xml version="1.0" encoding="utf-8"?>
 <p:sld xmlns:a="http://schemas.openxmlformats.org/drawingml/2006/main" xmlns:r="http://schemas.openxmlformats.org/officeDocument/2006/relationships" xmlns:p="http://schemas.openxmlformats.org/presentationml/2006/main">
   <p:cSld>
@@ -5958,7 +5932,7 @@
       </p:grpSpPr>
       <p:sp>
         <p:nvSpPr>
-          <p:cNvPr id="2" name="Title 1"/>
+          <p:cNvPr id="3" name="Title 2"/>
           <p:cNvSpPr>
             <a:spLocks noGrp="1"/>
           </p:cNvSpPr>
@@ -5973,7 +5947,7 @@
           <a:p>
             <a:r>
               <a:rPr lang="en-US" dirty="0" smtClean="0"/>
-              <a:t>What comes next</a:t>
+              <a:t>Acceptance plan</a:t>
             </a:r>
             <a:endParaRPr lang="en-US" dirty="0"/>
           </a:p>
@@ -5981,7 +5955,7 @@
       </p:sp>
       <p:sp>
         <p:nvSpPr>
-          <p:cNvPr id="3" name="Content Placeholder 2"/>
+          <p:cNvPr id="4" name="Content Placeholder 3"/>
           <p:cNvSpPr>
             <a:spLocks noGrp="1"/>
           </p:cNvSpPr>
@@ -5992,85 +5966,121 @@
         <p:spPr/>
         <p:txBody>
           <a:bodyPr>
-            <a:normAutofit fontScale="62500" lnSpcReduction="20000"/>
+            <a:normAutofit fontScale="85000" lnSpcReduction="10000"/>
           </a:bodyPr>
           <a:lstStyle/>
           <a:p>
             <a:r>
-              <a:rPr lang="en-US" sz="3200" dirty="0" smtClean="0"/>
-              <a:t>Kyle/Josh (Apple) and Amelia (Android):</a:t>
+              <a:rPr lang="en-US" dirty="0">
+                <a:solidFill>
+                  <a:schemeClr val="accent2"/>
+                </a:solidFill>
+              </a:rPr>
+              <a:t>Display Current Question </a:t>
             </a:r>
           </a:p>
           <a:p>
             <a:pPr lvl="1"/>
             <a:r>
-              <a:rPr lang="en-US" sz="2800" dirty="0" smtClean="0"/>
-              <a:t>Database connectivity</a:t>
+              <a:rPr lang="en-US" dirty="0">
+                <a:solidFill>
+                  <a:schemeClr val="accent2"/>
+                </a:solidFill>
+              </a:rPr>
+              <a:t>Selected question is displayed on desktop application</a:t>
+            </a:r>
+          </a:p>
+          <a:p>
+            <a:r>
+              <a:rPr lang="en-US" dirty="0">
+                <a:solidFill>
+                  <a:schemeClr val="accent2"/>
+                </a:solidFill>
+              </a:rPr>
+              <a:t>Selected Displayed Answers </a:t>
             </a:r>
           </a:p>
           <a:p>
             <a:pPr lvl="1"/>
             <a:r>
-              <a:rPr lang="en-US" sz="2800" dirty="0" smtClean="0"/>
-              <a:t>Seeing if answer is chosen</a:t>
+              <a:rPr lang="en-US" dirty="0">
+                <a:solidFill>
+                  <a:schemeClr val="accent2"/>
+                </a:solidFill>
+              </a:rPr>
+              <a:t>Desktop app can display selected answers</a:t>
+            </a:r>
+          </a:p>
+          <a:p>
+            <a:r>
+              <a:rPr lang="en-US" dirty="0">
+                <a:solidFill>
+                  <a:schemeClr val="accent2"/>
+                </a:solidFill>
+              </a:rPr>
+              <a:t>See if Answer is Chosen </a:t>
             </a:r>
           </a:p>
           <a:p>
             <a:pPr lvl="1"/>
             <a:r>
-              <a:rPr lang="en-US" sz="2800" dirty="0" smtClean="0"/>
-              <a:t>Finishing Sprint One tasks</a:t>
-            </a:r>
-            <a:endParaRPr lang="en-US" sz="2800" dirty="0" smtClean="0"/>
-          </a:p>
-          <a:p>
-            <a:r>
-              <a:rPr lang="en-US" sz="3200" dirty="0" smtClean="0"/>
-              <a:t>Zach (Desktop):</a:t>
+              <a:rPr lang="en-US" dirty="0">
+                <a:solidFill>
+                  <a:schemeClr val="accent2"/>
+                </a:solidFill>
+              </a:rPr>
+              <a:t>App notifies user when their answer is chosen</a:t>
+            </a:r>
+          </a:p>
+          <a:p>
+            <a:r>
+              <a:rPr lang="en-US" dirty="0">
+                <a:solidFill>
+                  <a:schemeClr val="accent2"/>
+                </a:solidFill>
+              </a:rPr>
+              <a:t>Tests </a:t>
             </a:r>
           </a:p>
           <a:p>
             <a:pPr lvl="1"/>
             <a:r>
-              <a:rPr lang="en-US" sz="2800" dirty="0" smtClean="0"/>
-              <a:t>Displaying a question</a:t>
+              <a:rPr lang="en-US" dirty="0">
+                <a:solidFill>
+                  <a:schemeClr val="accent2"/>
+                </a:solidFill>
+              </a:rPr>
+              <a:t>Choose a question and make sure it is being displayed on the desktop</a:t>
             </a:r>
           </a:p>
           <a:p>
             <a:pPr lvl="1"/>
             <a:r>
-              <a:rPr lang="en-US" sz="2800" dirty="0" smtClean="0"/>
-              <a:t>Selecting a student Answer</a:t>
+              <a:rPr lang="en-US" dirty="0">
+                <a:solidFill>
+                  <a:schemeClr val="accent2"/>
+                </a:solidFill>
+              </a:rPr>
+              <a:t>Select answers to be displayed and make sure they are being displayed</a:t>
             </a:r>
           </a:p>
           <a:p>
             <a:pPr lvl="1"/>
             <a:r>
-              <a:rPr lang="en-US" sz="2800" dirty="0" smtClean="0"/>
-              <a:t>Finishing Sprint One tasks</a:t>
-            </a:r>
-            <a:endParaRPr lang="en-US" sz="2800" dirty="0"/>
-          </a:p>
-          <a:p>
-            <a:r>
-              <a:rPr lang="en-US" sz="3200" dirty="0" smtClean="0"/>
-              <a:t>Amelia (Database):</a:t>
-            </a:r>
-          </a:p>
-          <a:p>
-            <a:pPr lvl="1"/>
-            <a:r>
-              <a:rPr lang="en-US" sz="2800" dirty="0" smtClean="0"/>
-              <a:t>Expanding functionality to include pictures</a:t>
-            </a:r>
-            <a:endParaRPr lang="en-US" sz="2800" dirty="0"/>
+              <a:rPr lang="en-US" dirty="0">
+                <a:solidFill>
+                  <a:schemeClr val="accent2"/>
+                </a:solidFill>
+              </a:rPr>
+              <a:t>Select an answer to be displayed and make sure the app notifies the user</a:t>
+            </a:r>
           </a:p>
         </p:txBody>
       </p:sp>
     </p:spTree>
     <p:extLst>
       <p:ext uri="{BB962C8B-B14F-4D97-AF65-F5344CB8AC3E}">
-        <p14:creationId xmlns:p14="http://schemas.microsoft.com/office/powerpoint/2010/main" val="100255636"/>
+        <p14:creationId xmlns:p14="http://schemas.microsoft.com/office/powerpoint/2010/main" val="1888057330"/>
       </p:ext>
     </p:extLst>
   </p:cSld>
@@ -6114,7 +6124,7 @@
           <a:p>
             <a:r>
               <a:rPr lang="en-US" dirty="0" smtClean="0"/>
-              <a:t>Questions?</a:t>
+              <a:t>What comes next</a:t>
             </a:r>
             <a:endParaRPr lang="en-US" dirty="0"/>
           </a:p>
@@ -6132,17 +6142,133 @@
         </p:nvSpPr>
         <p:spPr/>
         <p:txBody>
-          <a:bodyPr/>
-          <a:lstStyle/>
-          <a:p>
-            <a:endParaRPr lang="en-US"/>
+          <a:bodyPr>
+            <a:normAutofit fontScale="62500" lnSpcReduction="20000"/>
+          </a:bodyPr>
+          <a:lstStyle/>
+          <a:p>
+            <a:r>
+              <a:rPr lang="en-US" sz="3200" dirty="0" smtClean="0">
+                <a:solidFill>
+                  <a:schemeClr val="accent2"/>
+                </a:solidFill>
+              </a:rPr>
+              <a:t>Kyle/Josh (Apple) and Amelia (Android):</a:t>
+            </a:r>
+          </a:p>
+          <a:p>
+            <a:pPr lvl="1"/>
+            <a:r>
+              <a:rPr lang="en-US" sz="2800" dirty="0" smtClean="0">
+                <a:solidFill>
+                  <a:schemeClr val="accent2"/>
+                </a:solidFill>
+              </a:rPr>
+              <a:t>Database connectivity</a:t>
+            </a:r>
+          </a:p>
+          <a:p>
+            <a:pPr lvl="1"/>
+            <a:r>
+              <a:rPr lang="en-US" sz="2800" dirty="0" smtClean="0">
+                <a:solidFill>
+                  <a:schemeClr val="accent2"/>
+                </a:solidFill>
+              </a:rPr>
+              <a:t>Seeing if answer is chosen</a:t>
+            </a:r>
+          </a:p>
+          <a:p>
+            <a:pPr lvl="1"/>
+            <a:r>
+              <a:rPr lang="en-US" sz="2800" dirty="0" smtClean="0">
+                <a:solidFill>
+                  <a:schemeClr val="accent2"/>
+                </a:solidFill>
+              </a:rPr>
+              <a:t>Finishing Sprint One tasks</a:t>
+            </a:r>
+          </a:p>
+          <a:p>
+            <a:r>
+              <a:rPr lang="en-US" sz="3200" dirty="0" smtClean="0">
+                <a:solidFill>
+                  <a:schemeClr val="accent2"/>
+                </a:solidFill>
+              </a:rPr>
+              <a:t>Zach (Desktop):</a:t>
+            </a:r>
+          </a:p>
+          <a:p>
+            <a:pPr lvl="1"/>
+            <a:r>
+              <a:rPr lang="en-US" sz="2800" dirty="0" smtClean="0">
+                <a:solidFill>
+                  <a:schemeClr val="accent2"/>
+                </a:solidFill>
+              </a:rPr>
+              <a:t>Displaying a question</a:t>
+            </a:r>
+          </a:p>
+          <a:p>
+            <a:pPr lvl="1"/>
+            <a:r>
+              <a:rPr lang="en-US" sz="2800" dirty="0" smtClean="0">
+                <a:solidFill>
+                  <a:schemeClr val="accent2"/>
+                </a:solidFill>
+              </a:rPr>
+              <a:t>Selecting a student Answer</a:t>
+            </a:r>
+          </a:p>
+          <a:p>
+            <a:pPr lvl="1"/>
+            <a:r>
+              <a:rPr lang="en-US" sz="2800" dirty="0" smtClean="0">
+                <a:solidFill>
+                  <a:schemeClr val="accent2"/>
+                </a:solidFill>
+              </a:rPr>
+              <a:t>Finishing Sprint One tasks</a:t>
+            </a:r>
+            <a:endParaRPr lang="en-US" sz="2800" dirty="0">
+              <a:solidFill>
+                <a:schemeClr val="accent2"/>
+              </a:solidFill>
+            </a:endParaRPr>
+          </a:p>
+          <a:p>
+            <a:r>
+              <a:rPr lang="en-US" sz="3200" dirty="0" smtClean="0">
+                <a:solidFill>
+                  <a:schemeClr val="accent2"/>
+                </a:solidFill>
+              </a:rPr>
+              <a:t>Amelia (Database):</a:t>
+            </a:r>
+          </a:p>
+          <a:p>
+            <a:pPr lvl="1"/>
+            <a:r>
+              <a:rPr lang="en-US" sz="2800" dirty="0" smtClean="0">
+                <a:solidFill>
+                  <a:schemeClr val="accent2"/>
+                </a:solidFill>
+              </a:rPr>
+              <a:t>Expanding functionality to include pictures</a:t>
+            </a:r>
+            <a:endParaRPr lang="en-US" sz="2800" dirty="0">
+              <a:solidFill>
+                <a:schemeClr val="accent2"/>
+              </a:solidFill>
+            </a:endParaRPr>
           </a:p>
         </p:txBody>
       </p:sp>
     </p:spTree>
     <p:extLst>
       <p:ext uri="{BB962C8B-B14F-4D97-AF65-F5344CB8AC3E}">
-        <p14:creationId xmlns:p14="http://schemas.microsoft.com/office/powerpoint/2010/main" val="3068148798"/>
+        <p14:creationId xmlns:p14="http://schemas.microsoft.com/office/powerpoint/2010/main" val="100255636"/>
       </p:ext>
     </p:extLst>
   </p:cSld>

</xml_diff>

<commit_message>
Added risk assessment and time estimate to presentation
</commit_message>
<xml_diff>
--- a/Presentations/Sprint Two Elaboration.pptx
+++ b/Presentations/Sprint Two Elaboration.pptx
@@ -12,9 +12,11 @@
     <p:sldId id="266" r:id="rId6"/>
     <p:sldId id="260" r:id="rId7"/>
     <p:sldId id="261" r:id="rId8"/>
-    <p:sldId id="262" r:id="rId9"/>
-    <p:sldId id="263" r:id="rId10"/>
-    <p:sldId id="264" r:id="rId11"/>
+    <p:sldId id="267" r:id="rId9"/>
+    <p:sldId id="268" r:id="rId10"/>
+    <p:sldId id="262" r:id="rId11"/>
+    <p:sldId id="263" r:id="rId12"/>
+    <p:sldId id="264" r:id="rId13"/>
   </p:sldIdLst>
   <p:sldSz cx="12192000" cy="6858000"/>
   <p:notesSz cx="6858000" cy="9144000"/>
@@ -312,7 +314,7 @@
           <a:p>
             <a:fld id="{3451BBA6-36DF-47E0-BB86-26E55055E269}" type="datetimeFigureOut">
               <a:rPr lang="en-US" smtClean="0"/>
-              <a:t>1/23/2017</a:t>
+              <a:t>1/25/2017</a:t>
             </a:fld>
             <a:endParaRPr lang="en-US"/>
           </a:p>
@@ -748,7 +750,7 @@
           <a:p>
             <a:fld id="{3451BBA6-36DF-47E0-BB86-26E55055E269}" type="datetimeFigureOut">
               <a:rPr lang="en-US" smtClean="0"/>
-              <a:t>1/23/2017</a:t>
+              <a:t>1/25/2017</a:t>
             </a:fld>
             <a:endParaRPr lang="en-US"/>
           </a:p>
@@ -998,7 +1000,7 @@
           <a:p>
             <a:fld id="{3451BBA6-36DF-47E0-BB86-26E55055E269}" type="datetimeFigureOut">
               <a:rPr lang="en-US" smtClean="0"/>
-              <a:t>1/23/2017</a:t>
+              <a:t>1/25/2017</a:t>
             </a:fld>
             <a:endParaRPr lang="en-US"/>
           </a:p>
@@ -1306,7 +1308,7 @@
           <a:p>
             <a:fld id="{3451BBA6-36DF-47E0-BB86-26E55055E269}" type="datetimeFigureOut">
               <a:rPr lang="en-US" smtClean="0"/>
-              <a:t>1/23/2017</a:t>
+              <a:t>1/25/2017</a:t>
             </a:fld>
             <a:endParaRPr lang="en-US"/>
           </a:p>
@@ -1624,7 +1626,7 @@
           <a:p>
             <a:fld id="{3451BBA6-36DF-47E0-BB86-26E55055E269}" type="datetimeFigureOut">
               <a:rPr lang="en-US" smtClean="0"/>
-              <a:t>1/23/2017</a:t>
+              <a:t>1/25/2017</a:t>
             </a:fld>
             <a:endParaRPr lang="en-US"/>
           </a:p>
@@ -1926,7 +1928,7 @@
           <a:p>
             <a:fld id="{3451BBA6-36DF-47E0-BB86-26E55055E269}" type="datetimeFigureOut">
               <a:rPr lang="en-US" smtClean="0"/>
-              <a:t>1/23/2017</a:t>
+              <a:t>1/25/2017</a:t>
             </a:fld>
             <a:endParaRPr lang="en-US"/>
           </a:p>
@@ -2293,7 +2295,7 @@
           <a:p>
             <a:fld id="{3451BBA6-36DF-47E0-BB86-26E55055E269}" type="datetimeFigureOut">
               <a:rPr lang="en-US" smtClean="0"/>
-              <a:t>1/23/2017</a:t>
+              <a:t>1/25/2017</a:t>
             </a:fld>
             <a:endParaRPr lang="en-US"/>
           </a:p>
@@ -2467,7 +2469,7 @@
           <a:p>
             <a:fld id="{3451BBA6-36DF-47E0-BB86-26E55055E269}" type="datetimeFigureOut">
               <a:rPr lang="en-US" smtClean="0"/>
-              <a:t>1/23/2017</a:t>
+              <a:t>1/25/2017</a:t>
             </a:fld>
             <a:endParaRPr lang="en-US"/>
           </a:p>
@@ -2647,7 +2649,7 @@
           <a:p>
             <a:fld id="{3451BBA6-36DF-47E0-BB86-26E55055E269}" type="datetimeFigureOut">
               <a:rPr lang="en-US" smtClean="0"/>
-              <a:t>1/23/2017</a:t>
+              <a:t>1/25/2017</a:t>
             </a:fld>
             <a:endParaRPr lang="en-US"/>
           </a:p>
@@ -2817,7 +2819,7 @@
           <a:p>
             <a:fld id="{3451BBA6-36DF-47E0-BB86-26E55055E269}" type="datetimeFigureOut">
               <a:rPr lang="en-US" smtClean="0"/>
-              <a:t>1/23/2017</a:t>
+              <a:t>1/25/2017</a:t>
             </a:fld>
             <a:endParaRPr lang="en-US"/>
           </a:p>
@@ -3067,7 +3069,7 @@
           <a:p>
             <a:fld id="{3451BBA6-36DF-47E0-BB86-26E55055E269}" type="datetimeFigureOut">
               <a:rPr lang="en-US" smtClean="0"/>
-              <a:t>1/23/2017</a:t>
+              <a:t>1/25/2017</a:t>
             </a:fld>
             <a:endParaRPr lang="en-US"/>
           </a:p>
@@ -3303,7 +3305,7 @@
           <a:p>
             <a:fld id="{3451BBA6-36DF-47E0-BB86-26E55055E269}" type="datetimeFigureOut">
               <a:rPr lang="en-US" smtClean="0"/>
-              <a:t>1/23/2017</a:t>
+              <a:t>1/25/2017</a:t>
             </a:fld>
             <a:endParaRPr lang="en-US"/>
           </a:p>
@@ -3685,7 +3687,7 @@
           <a:p>
             <a:fld id="{3451BBA6-36DF-47E0-BB86-26E55055E269}" type="datetimeFigureOut">
               <a:rPr lang="en-US" smtClean="0"/>
-              <a:t>1/23/2017</a:t>
+              <a:t>1/25/2017</a:t>
             </a:fld>
             <a:endParaRPr lang="en-US"/>
           </a:p>
@@ -3803,7 +3805,7 @@
           <a:p>
             <a:fld id="{3451BBA6-36DF-47E0-BB86-26E55055E269}" type="datetimeFigureOut">
               <a:rPr lang="en-US" smtClean="0"/>
-              <a:t>1/23/2017</a:t>
+              <a:t>1/25/2017</a:t>
             </a:fld>
             <a:endParaRPr lang="en-US"/>
           </a:p>
@@ -3898,7 +3900,7 @@
           <a:p>
             <a:fld id="{3451BBA6-36DF-47E0-BB86-26E55055E269}" type="datetimeFigureOut">
               <a:rPr lang="en-US" smtClean="0"/>
-              <a:t>1/23/2017</a:t>
+              <a:t>1/25/2017</a:t>
             </a:fld>
             <a:endParaRPr lang="en-US"/>
           </a:p>
@@ -4153,7 +4155,7 @@
           <a:p>
             <a:fld id="{3451BBA6-36DF-47E0-BB86-26E55055E269}" type="datetimeFigureOut">
               <a:rPr lang="en-US" smtClean="0"/>
-              <a:t>1/23/2017</a:t>
+              <a:t>1/25/2017</a:t>
             </a:fld>
             <a:endParaRPr lang="en-US"/>
           </a:p>
@@ -4436,7 +4438,7 @@
           <a:p>
             <a:fld id="{3451BBA6-36DF-47E0-BB86-26E55055E269}" type="datetimeFigureOut">
               <a:rPr lang="en-US" smtClean="0"/>
-              <a:t>1/23/2017</a:t>
+              <a:t>1/25/2017</a:t>
             </a:fld>
             <a:endParaRPr lang="en-US"/>
           </a:p>
@@ -4842,7 +4844,7 @@
           <a:p>
             <a:fld id="{3451BBA6-36DF-47E0-BB86-26E55055E269}" type="datetimeFigureOut">
               <a:rPr lang="en-US" smtClean="0"/>
-              <a:t>1/23/2017</a:t>
+              <a:t>1/25/2017</a:t>
             </a:fld>
             <a:endParaRPr lang="en-US"/>
           </a:p>
@@ -5493,6 +5495,371 @@
       </p:grpSpPr>
       <p:sp>
         <p:nvSpPr>
+          <p:cNvPr id="3" name="Title 2"/>
+          <p:cNvSpPr>
+            <a:spLocks noGrp="1"/>
+          </p:cNvSpPr>
+          <p:nvPr>
+            <p:ph type="title"/>
+          </p:nvPr>
+        </p:nvSpPr>
+        <p:spPr/>
+        <p:txBody>
+          <a:bodyPr/>
+          <a:lstStyle/>
+          <a:p>
+            <a:r>
+              <a:rPr lang="en-US" dirty="0" smtClean="0"/>
+              <a:t>Acceptance plan</a:t>
+            </a:r>
+            <a:endParaRPr lang="en-US" dirty="0"/>
+          </a:p>
+        </p:txBody>
+      </p:sp>
+      <p:sp>
+        <p:nvSpPr>
+          <p:cNvPr id="4" name="Content Placeholder 3"/>
+          <p:cNvSpPr>
+            <a:spLocks noGrp="1"/>
+          </p:cNvSpPr>
+          <p:nvPr>
+            <p:ph idx="1"/>
+          </p:nvPr>
+        </p:nvSpPr>
+        <p:spPr/>
+        <p:txBody>
+          <a:bodyPr>
+            <a:normAutofit fontScale="85000" lnSpcReduction="10000"/>
+          </a:bodyPr>
+          <a:lstStyle/>
+          <a:p>
+            <a:r>
+              <a:rPr lang="en-US" dirty="0">
+                <a:solidFill>
+                  <a:schemeClr val="accent2"/>
+                </a:solidFill>
+              </a:rPr>
+              <a:t>Display Current Question </a:t>
+            </a:r>
+          </a:p>
+          <a:p>
+            <a:pPr lvl="1"/>
+            <a:r>
+              <a:rPr lang="en-US" dirty="0">
+                <a:solidFill>
+                  <a:schemeClr val="accent2"/>
+                </a:solidFill>
+              </a:rPr>
+              <a:t>Selected question is displayed on desktop application</a:t>
+            </a:r>
+          </a:p>
+          <a:p>
+            <a:r>
+              <a:rPr lang="en-US" dirty="0">
+                <a:solidFill>
+                  <a:schemeClr val="accent2"/>
+                </a:solidFill>
+              </a:rPr>
+              <a:t>Selected Displayed Answers </a:t>
+            </a:r>
+          </a:p>
+          <a:p>
+            <a:pPr lvl="1"/>
+            <a:r>
+              <a:rPr lang="en-US" dirty="0">
+                <a:solidFill>
+                  <a:schemeClr val="accent2"/>
+                </a:solidFill>
+              </a:rPr>
+              <a:t>Desktop app can display selected answers</a:t>
+            </a:r>
+          </a:p>
+          <a:p>
+            <a:r>
+              <a:rPr lang="en-US" dirty="0">
+                <a:solidFill>
+                  <a:schemeClr val="accent2"/>
+                </a:solidFill>
+              </a:rPr>
+              <a:t>See if Answer is Chosen </a:t>
+            </a:r>
+          </a:p>
+          <a:p>
+            <a:pPr lvl="1"/>
+            <a:r>
+              <a:rPr lang="en-US" dirty="0">
+                <a:solidFill>
+                  <a:schemeClr val="accent2"/>
+                </a:solidFill>
+              </a:rPr>
+              <a:t>App notifies user when their answer is chosen</a:t>
+            </a:r>
+          </a:p>
+          <a:p>
+            <a:r>
+              <a:rPr lang="en-US" dirty="0">
+                <a:solidFill>
+                  <a:schemeClr val="accent2"/>
+                </a:solidFill>
+              </a:rPr>
+              <a:t>Tests </a:t>
+            </a:r>
+          </a:p>
+          <a:p>
+            <a:pPr lvl="1"/>
+            <a:r>
+              <a:rPr lang="en-US" dirty="0">
+                <a:solidFill>
+                  <a:schemeClr val="accent2"/>
+                </a:solidFill>
+              </a:rPr>
+              <a:t>Choose a question and make sure it is being displayed on the desktop</a:t>
+            </a:r>
+          </a:p>
+          <a:p>
+            <a:pPr lvl="1"/>
+            <a:r>
+              <a:rPr lang="en-US" dirty="0">
+                <a:solidFill>
+                  <a:schemeClr val="accent2"/>
+                </a:solidFill>
+              </a:rPr>
+              <a:t>Select answers to be displayed and make sure they are being displayed</a:t>
+            </a:r>
+          </a:p>
+          <a:p>
+            <a:pPr lvl="1"/>
+            <a:r>
+              <a:rPr lang="en-US" dirty="0">
+                <a:solidFill>
+                  <a:schemeClr val="accent2"/>
+                </a:solidFill>
+              </a:rPr>
+              <a:t>Select an answer to be displayed and make sure the app notifies the user</a:t>
+            </a:r>
+          </a:p>
+        </p:txBody>
+      </p:sp>
+    </p:spTree>
+    <p:extLst>
+      <p:ext uri="{BB962C8B-B14F-4D97-AF65-F5344CB8AC3E}">
+        <p14:creationId xmlns:p14="http://schemas.microsoft.com/office/powerpoint/2010/main" val="1888057330"/>
+      </p:ext>
+    </p:extLst>
+  </p:cSld>
+  <p:clrMapOvr>
+    <a:masterClrMapping/>
+  </p:clrMapOvr>
+</p:sld>
+</file>
+
+<file path=ppt/slides/slide11.xml><?xml version="1.0" encoding="utf-8"?>
+<p:sld xmlns:a="http://schemas.openxmlformats.org/drawingml/2006/main" xmlns:r="http://schemas.openxmlformats.org/officeDocument/2006/relationships" xmlns:p="http://schemas.openxmlformats.org/presentationml/2006/main">
+  <p:cSld>
+    <p:spTree>
+      <p:nvGrpSpPr>
+        <p:cNvPr id="1" name=""/>
+        <p:cNvGrpSpPr/>
+        <p:nvPr/>
+      </p:nvGrpSpPr>
+      <p:grpSpPr>
+        <a:xfrm>
+          <a:off x="0" y="0"/>
+          <a:ext cx="0" cy="0"/>
+          <a:chOff x="0" y="0"/>
+          <a:chExt cx="0" cy="0"/>
+        </a:xfrm>
+      </p:grpSpPr>
+      <p:sp>
+        <p:nvSpPr>
+          <p:cNvPr id="2" name="Title 1"/>
+          <p:cNvSpPr>
+            <a:spLocks noGrp="1"/>
+          </p:cNvSpPr>
+          <p:nvPr>
+            <p:ph type="title"/>
+          </p:nvPr>
+        </p:nvSpPr>
+        <p:spPr/>
+        <p:txBody>
+          <a:bodyPr/>
+          <a:lstStyle/>
+          <a:p>
+            <a:r>
+              <a:rPr lang="en-US" dirty="0" smtClean="0"/>
+              <a:t>What comes next</a:t>
+            </a:r>
+            <a:endParaRPr lang="en-US" dirty="0"/>
+          </a:p>
+        </p:txBody>
+      </p:sp>
+      <p:sp>
+        <p:nvSpPr>
+          <p:cNvPr id="3" name="Content Placeholder 2"/>
+          <p:cNvSpPr>
+            <a:spLocks noGrp="1"/>
+          </p:cNvSpPr>
+          <p:nvPr>
+            <p:ph idx="1"/>
+          </p:nvPr>
+        </p:nvSpPr>
+        <p:spPr/>
+        <p:txBody>
+          <a:bodyPr>
+            <a:normAutofit fontScale="62500" lnSpcReduction="20000"/>
+          </a:bodyPr>
+          <a:lstStyle/>
+          <a:p>
+            <a:r>
+              <a:rPr lang="en-US" sz="3200" dirty="0" smtClean="0">
+                <a:solidFill>
+                  <a:schemeClr val="accent2"/>
+                </a:solidFill>
+              </a:rPr>
+              <a:t>Kyle/Josh (Apple) and Amelia (Android):</a:t>
+            </a:r>
+          </a:p>
+          <a:p>
+            <a:pPr lvl="1"/>
+            <a:r>
+              <a:rPr lang="en-US" sz="2800" dirty="0" smtClean="0">
+                <a:solidFill>
+                  <a:schemeClr val="accent2"/>
+                </a:solidFill>
+              </a:rPr>
+              <a:t>Database connectivity</a:t>
+            </a:r>
+          </a:p>
+          <a:p>
+            <a:pPr lvl="1"/>
+            <a:r>
+              <a:rPr lang="en-US" sz="2800" dirty="0" smtClean="0">
+                <a:solidFill>
+                  <a:schemeClr val="accent2"/>
+                </a:solidFill>
+              </a:rPr>
+              <a:t>Seeing if answer is chosen</a:t>
+            </a:r>
+          </a:p>
+          <a:p>
+            <a:pPr lvl="1"/>
+            <a:r>
+              <a:rPr lang="en-US" sz="2800" dirty="0" smtClean="0">
+                <a:solidFill>
+                  <a:schemeClr val="accent2"/>
+                </a:solidFill>
+              </a:rPr>
+              <a:t>Finishing Sprint One tasks</a:t>
+            </a:r>
+          </a:p>
+          <a:p>
+            <a:r>
+              <a:rPr lang="en-US" sz="3200" dirty="0" smtClean="0">
+                <a:solidFill>
+                  <a:schemeClr val="accent2"/>
+                </a:solidFill>
+              </a:rPr>
+              <a:t>Zach (Desktop):</a:t>
+            </a:r>
+          </a:p>
+          <a:p>
+            <a:pPr lvl="1"/>
+            <a:r>
+              <a:rPr lang="en-US" sz="2800" dirty="0" smtClean="0">
+                <a:solidFill>
+                  <a:schemeClr val="accent2"/>
+                </a:solidFill>
+              </a:rPr>
+              <a:t>Displaying a question</a:t>
+            </a:r>
+          </a:p>
+          <a:p>
+            <a:pPr lvl="1"/>
+            <a:r>
+              <a:rPr lang="en-US" sz="2800" dirty="0" smtClean="0">
+                <a:solidFill>
+                  <a:schemeClr val="accent2"/>
+                </a:solidFill>
+              </a:rPr>
+              <a:t>Selecting a student Answer</a:t>
+            </a:r>
+          </a:p>
+          <a:p>
+            <a:pPr lvl="1"/>
+            <a:r>
+              <a:rPr lang="en-US" sz="2800" dirty="0" smtClean="0">
+                <a:solidFill>
+                  <a:schemeClr val="accent2"/>
+                </a:solidFill>
+              </a:rPr>
+              <a:t>Finishing Sprint One tasks</a:t>
+            </a:r>
+            <a:endParaRPr lang="en-US" sz="2800" dirty="0">
+              <a:solidFill>
+                <a:schemeClr val="accent2"/>
+              </a:solidFill>
+            </a:endParaRPr>
+          </a:p>
+          <a:p>
+            <a:r>
+              <a:rPr lang="en-US" sz="3200" dirty="0" smtClean="0">
+                <a:solidFill>
+                  <a:schemeClr val="accent2"/>
+                </a:solidFill>
+              </a:rPr>
+              <a:t>Amelia (Database):</a:t>
+            </a:r>
+          </a:p>
+          <a:p>
+            <a:pPr lvl="1"/>
+            <a:r>
+              <a:rPr lang="en-US" sz="2800" dirty="0" smtClean="0">
+                <a:solidFill>
+                  <a:schemeClr val="accent2"/>
+                </a:solidFill>
+              </a:rPr>
+              <a:t>Expanding functionality to include pictures</a:t>
+            </a:r>
+            <a:endParaRPr lang="en-US" sz="2800" dirty="0">
+              <a:solidFill>
+                <a:schemeClr val="accent2"/>
+              </a:solidFill>
+            </a:endParaRPr>
+          </a:p>
+        </p:txBody>
+      </p:sp>
+    </p:spTree>
+    <p:extLst>
+      <p:ext uri="{BB962C8B-B14F-4D97-AF65-F5344CB8AC3E}">
+        <p14:creationId xmlns:p14="http://schemas.microsoft.com/office/powerpoint/2010/main" val="100255636"/>
+      </p:ext>
+    </p:extLst>
+  </p:cSld>
+  <p:clrMapOvr>
+    <a:masterClrMapping/>
+  </p:clrMapOvr>
+</p:sld>
+</file>
+
+<file path=ppt/slides/slide12.xml><?xml version="1.0" encoding="utf-8"?>
+<p:sld xmlns:a="http://schemas.openxmlformats.org/drawingml/2006/main" xmlns:r="http://schemas.openxmlformats.org/officeDocument/2006/relationships" xmlns:p="http://schemas.openxmlformats.org/presentationml/2006/main">
+  <p:cSld>
+    <p:spTree>
+      <p:nvGrpSpPr>
+        <p:cNvPr id="1" name=""/>
+        <p:cNvGrpSpPr/>
+        <p:nvPr/>
+      </p:nvGrpSpPr>
+      <p:grpSpPr>
+        <a:xfrm>
+          <a:off x="0" y="0"/>
+          <a:ext cx="0" cy="0"/>
+          <a:chOff x="0" y="0"/>
+          <a:chExt cx="0" cy="0"/>
+        </a:xfrm>
+      </p:grpSpPr>
+      <p:sp>
+        <p:nvSpPr>
           <p:cNvPr id="2" name="Title 1"/>
           <p:cNvSpPr>
             <a:spLocks noGrp="1"/>
@@ -5930,157 +6297,34 @@
           <a:chExt cx="0" cy="0"/>
         </a:xfrm>
       </p:grpSpPr>
-      <p:sp>
-        <p:nvSpPr>
-          <p:cNvPr id="3" name="Title 2"/>
-          <p:cNvSpPr>
-            <a:spLocks noGrp="1"/>
-          </p:cNvSpPr>
-          <p:nvPr>
-            <p:ph type="title"/>
-          </p:nvPr>
-        </p:nvSpPr>
-        <p:spPr/>
-        <p:txBody>
-          <a:bodyPr/>
-          <a:lstStyle/>
-          <a:p>
-            <a:r>
-              <a:rPr lang="en-US" dirty="0" smtClean="0"/>
-              <a:t>Acceptance plan</a:t>
-            </a:r>
-            <a:endParaRPr lang="en-US" dirty="0"/>
-          </a:p>
-        </p:txBody>
-      </p:sp>
-      <p:sp>
-        <p:nvSpPr>
-          <p:cNvPr id="4" name="Content Placeholder 3"/>
-          <p:cNvSpPr>
-            <a:spLocks noGrp="1"/>
-          </p:cNvSpPr>
-          <p:nvPr>
-            <p:ph idx="1"/>
-          </p:nvPr>
-        </p:nvSpPr>
-        <p:spPr/>
-        <p:txBody>
-          <a:bodyPr>
-            <a:normAutofit fontScale="85000" lnSpcReduction="10000"/>
-          </a:bodyPr>
-          <a:lstStyle/>
-          <a:p>
-            <a:r>
-              <a:rPr lang="en-US" dirty="0">
-                <a:solidFill>
-                  <a:schemeClr val="accent2"/>
-                </a:solidFill>
-              </a:rPr>
-              <a:t>Display Current Question </a:t>
-            </a:r>
-          </a:p>
-          <a:p>
-            <a:pPr lvl="1"/>
-            <a:r>
-              <a:rPr lang="en-US" dirty="0">
-                <a:solidFill>
-                  <a:schemeClr val="accent2"/>
-                </a:solidFill>
-              </a:rPr>
-              <a:t>Selected question is displayed on desktop application</a:t>
-            </a:r>
-          </a:p>
-          <a:p>
-            <a:r>
-              <a:rPr lang="en-US" dirty="0">
-                <a:solidFill>
-                  <a:schemeClr val="accent2"/>
-                </a:solidFill>
-              </a:rPr>
-              <a:t>Selected Displayed Answers </a:t>
-            </a:r>
-          </a:p>
-          <a:p>
-            <a:pPr lvl="1"/>
-            <a:r>
-              <a:rPr lang="en-US" dirty="0">
-                <a:solidFill>
-                  <a:schemeClr val="accent2"/>
-                </a:solidFill>
-              </a:rPr>
-              <a:t>Desktop app can display selected answers</a:t>
-            </a:r>
-          </a:p>
-          <a:p>
-            <a:r>
-              <a:rPr lang="en-US" dirty="0">
-                <a:solidFill>
-                  <a:schemeClr val="accent2"/>
-                </a:solidFill>
-              </a:rPr>
-              <a:t>See if Answer is Chosen </a:t>
-            </a:r>
-          </a:p>
-          <a:p>
-            <a:pPr lvl="1"/>
-            <a:r>
-              <a:rPr lang="en-US" dirty="0">
-                <a:solidFill>
-                  <a:schemeClr val="accent2"/>
-                </a:solidFill>
-              </a:rPr>
-              <a:t>App notifies user when their answer is chosen</a:t>
-            </a:r>
-          </a:p>
-          <a:p>
-            <a:r>
-              <a:rPr lang="en-US" dirty="0">
-                <a:solidFill>
-                  <a:schemeClr val="accent2"/>
-                </a:solidFill>
-              </a:rPr>
-              <a:t>Tests </a:t>
-            </a:r>
-          </a:p>
-          <a:p>
-            <a:pPr lvl="1"/>
-            <a:r>
-              <a:rPr lang="en-US" dirty="0">
-                <a:solidFill>
-                  <a:schemeClr val="accent2"/>
-                </a:solidFill>
-              </a:rPr>
-              <a:t>Choose a question and make sure it is being displayed on the desktop</a:t>
-            </a:r>
-          </a:p>
-          <a:p>
-            <a:pPr lvl="1"/>
-            <a:r>
-              <a:rPr lang="en-US" dirty="0">
-                <a:solidFill>
-                  <a:schemeClr val="accent2"/>
-                </a:solidFill>
-              </a:rPr>
-              <a:t>Select answers to be displayed and make sure they are being displayed</a:t>
-            </a:r>
-          </a:p>
-          <a:p>
-            <a:pPr lvl="1"/>
-            <a:r>
-              <a:rPr lang="en-US" dirty="0">
-                <a:solidFill>
-                  <a:schemeClr val="accent2"/>
-                </a:solidFill>
-              </a:rPr>
-              <a:t>Select an answer to be displayed and make sure the app notifies the user</a:t>
-            </a:r>
-          </a:p>
-        </p:txBody>
-      </p:sp>
+      <p:pic>
+        <p:nvPicPr>
+          <p:cNvPr id="2" name="Picture 1"/>
+          <p:cNvPicPr>
+            <a:picLocks noChangeAspect="1"/>
+          </p:cNvPicPr>
+          <p:nvPr/>
+        </p:nvPicPr>
+        <p:blipFill>
+          <a:blip r:embed="rId2"/>
+          <a:stretch>
+            <a:fillRect/>
+          </a:stretch>
+        </p:blipFill>
+        <p:spPr>
+          <a:xfrm>
+            <a:off x="1850701" y="414981"/>
+            <a:ext cx="8665811" cy="5862166"/>
+          </a:xfrm>
+          <a:prstGeom prst="rect">
+            <a:avLst/>
+          </a:prstGeom>
+        </p:spPr>
+      </p:pic>
     </p:spTree>
     <p:extLst>
       <p:ext uri="{BB962C8B-B14F-4D97-AF65-F5344CB8AC3E}">
-        <p14:creationId xmlns:p14="http://schemas.microsoft.com/office/powerpoint/2010/main" val="1888057330"/>
+        <p14:creationId xmlns:p14="http://schemas.microsoft.com/office/powerpoint/2010/main" val="1017049098"/>
       </p:ext>
     </p:extLst>
   </p:cSld>
@@ -6124,7 +6368,7 @@
           <a:p>
             <a:r>
               <a:rPr lang="en-US" dirty="0" smtClean="0"/>
-              <a:t>What comes next</a:t>
+              <a:t>Risk assessment</a:t>
             </a:r>
             <a:endParaRPr lang="en-US" dirty="0"/>
           </a:p>
@@ -6142,133 +6386,39 @@
         </p:nvSpPr>
         <p:spPr/>
         <p:txBody>
-          <a:bodyPr>
-            <a:normAutofit fontScale="62500" lnSpcReduction="20000"/>
-          </a:bodyPr>
-          <a:lstStyle/>
-          <a:p>
-            <a:r>
-              <a:rPr lang="en-US" sz="3200" dirty="0" smtClean="0">
+          <a:bodyPr/>
+          <a:lstStyle/>
+          <a:p>
+            <a:r>
+              <a:rPr lang="en-US" dirty="0" smtClean="0">
                 <a:solidFill>
                   <a:schemeClr val="accent2"/>
                 </a:solidFill>
               </a:rPr>
-              <a:t>Kyle/Josh (Apple) and Amelia (Android):</a:t>
-            </a:r>
-          </a:p>
-          <a:p>
-            <a:pPr lvl="1"/>
-            <a:r>
-              <a:rPr lang="en-US" sz="2800" dirty="0" smtClean="0">
+              <a:t>Connectivity is mostly done</a:t>
+            </a:r>
+          </a:p>
+          <a:p>
+            <a:r>
+              <a:rPr lang="en-US" dirty="0" smtClean="0">
                 <a:solidFill>
                   <a:schemeClr val="accent2"/>
                 </a:solidFill>
               </a:rPr>
-              <a:t>Database connectivity</a:t>
-            </a:r>
-          </a:p>
-          <a:p>
-            <a:pPr lvl="1"/>
-            <a:r>
-              <a:rPr lang="en-US" sz="2800" dirty="0" smtClean="0">
-                <a:solidFill>
-                  <a:schemeClr val="accent2"/>
-                </a:solidFill>
-              </a:rPr>
-              <a:t>Seeing if answer is chosen</a:t>
-            </a:r>
-          </a:p>
-          <a:p>
-            <a:pPr lvl="1"/>
-            <a:r>
-              <a:rPr lang="en-US" sz="2800" dirty="0" smtClean="0">
-                <a:solidFill>
-                  <a:schemeClr val="accent2"/>
-                </a:solidFill>
-              </a:rPr>
-              <a:t>Finishing Sprint One tasks</a:t>
-            </a:r>
-          </a:p>
-          <a:p>
-            <a:r>
-              <a:rPr lang="en-US" sz="3200" dirty="0" smtClean="0">
-                <a:solidFill>
-                  <a:schemeClr val="accent2"/>
-                </a:solidFill>
-              </a:rPr>
-              <a:t>Zach (Desktop):</a:t>
-            </a:r>
-          </a:p>
-          <a:p>
-            <a:pPr lvl="1"/>
-            <a:r>
-              <a:rPr lang="en-US" sz="2800" dirty="0" smtClean="0">
-                <a:solidFill>
-                  <a:schemeClr val="accent2"/>
-                </a:solidFill>
-              </a:rPr>
-              <a:t>Displaying a question</a:t>
-            </a:r>
-          </a:p>
-          <a:p>
-            <a:pPr lvl="1"/>
-            <a:r>
-              <a:rPr lang="en-US" sz="2800" dirty="0" smtClean="0">
-                <a:solidFill>
-                  <a:schemeClr val="accent2"/>
-                </a:solidFill>
-              </a:rPr>
-              <a:t>Selecting a student Answer</a:t>
-            </a:r>
-          </a:p>
-          <a:p>
-            <a:pPr lvl="1"/>
-            <a:r>
-              <a:rPr lang="en-US" sz="2800" dirty="0" smtClean="0">
-                <a:solidFill>
-                  <a:schemeClr val="accent2"/>
-                </a:solidFill>
-              </a:rPr>
-              <a:t>Finishing Sprint One tasks</a:t>
-            </a:r>
-            <a:endParaRPr lang="en-US" sz="2800" dirty="0">
+              <a:t>Just adding features to base from sprint 1</a:t>
+            </a:r>
+            <a:endParaRPr lang="en-US" dirty="0">
               <a:solidFill>
                 <a:schemeClr val="accent2"/>
               </a:solidFill>
             </a:endParaRPr>
           </a:p>
-          <a:p>
-            <a:r>
-              <a:rPr lang="en-US" sz="3200" dirty="0" smtClean="0">
-                <a:solidFill>
-                  <a:schemeClr val="accent2"/>
-                </a:solidFill>
-              </a:rPr>
-              <a:t>Amelia (Database):</a:t>
-            </a:r>
-          </a:p>
-          <a:p>
-            <a:pPr lvl="1"/>
-            <a:r>
-              <a:rPr lang="en-US" sz="2800" dirty="0" smtClean="0">
-                <a:solidFill>
-                  <a:schemeClr val="accent2"/>
-                </a:solidFill>
-              </a:rPr>
-              <a:t>Expanding functionality to include pictures</a:t>
-            </a:r>
-            <a:endParaRPr lang="en-US" sz="2800" dirty="0">
-              <a:solidFill>
-                <a:schemeClr val="accent2"/>
-              </a:solidFill>
-            </a:endParaRPr>
-          </a:p>
         </p:txBody>
       </p:sp>
     </p:spTree>
     <p:extLst>
       <p:ext uri="{BB962C8B-B14F-4D97-AF65-F5344CB8AC3E}">
-        <p14:creationId xmlns:p14="http://schemas.microsoft.com/office/powerpoint/2010/main" val="100255636"/>
+        <p14:creationId xmlns:p14="http://schemas.microsoft.com/office/powerpoint/2010/main" val="2374725084"/>
       </p:ext>
     </p:extLst>
   </p:cSld>

</xml_diff>